<commit_message>
second stim tests same freq
</commit_message>
<xml_diff>
--- a/presentation/unibrowser-presentation.pptx
+++ b/presentation/unibrowser-presentation.pptx
@@ -117,7 +117,7 @@
   </p:defaultTextStyle>
   <p:extLst>
     <p:ext uri="{EFAFB233-063F-42B5-8137-9DF3F51BA10A}">
-      <p15:sldGuideLst xmlns:p15="http://schemas.microsoft.com/office/powerpoint/2012/main"/>
+      <p15:sldGuideLst xmlns:p15="http://schemas.microsoft.com/office/powerpoint/2012/main" xmlns=""/>
     </p:ext>
   </p:extLst>
 </p:presentation>
@@ -205,6 +205,7 @@
           <a:p>
             <a:fld id="{9EA79EC9-0526-4E66-A34B-727B0FF81E4E}" type="datetimeFigureOut">
               <a:rPr lang="de-DE" smtClean="0"/>
+              <a:pPr/>
               <a:t>07.10.2019</a:t>
             </a:fld>
             <a:endParaRPr lang="de-DE"/>
@@ -363,6 +364,7 @@
           <a:p>
             <a:fld id="{F71A8555-5A0A-44CC-9DDD-AC67622E4BAC}" type="slidenum">
               <a:rPr lang="de-DE" smtClean="0"/>
+              <a:pPr/>
               <a:t>‹#›</a:t>
             </a:fld>
             <a:endParaRPr lang="de-DE"/>
@@ -372,7 +374,7 @@
     </p:spTree>
     <p:extLst>
       <p:ext uri="{BB962C8B-B14F-4D97-AF65-F5344CB8AC3E}">
-        <p14:creationId xmlns:p14="http://schemas.microsoft.com/office/powerpoint/2010/main" val="709189723"/>
+        <p14:creationId xmlns:p14="http://schemas.microsoft.com/office/powerpoint/2010/main" xmlns="" val="709189723"/>
       </p:ext>
     </p:extLst>
   </p:cSld>
@@ -502,7 +504,7 @@
           <p:cNvPr id="2" name="Titel 1">
             <a:extLst>
               <a:ext uri="{FF2B5EF4-FFF2-40B4-BE49-F238E27FC236}">
-                <a16:creationId xmlns:a16="http://schemas.microsoft.com/office/drawing/2014/main" id="{C809B7F9-4F10-4592-8C6D-559EC9AFB7F3}"/>
+                <a16:creationId xmlns:a16="http://schemas.microsoft.com/office/drawing/2014/main" xmlns="" id="{C809B7F9-4F10-4592-8C6D-559EC9AFB7F3}"/>
               </a:ext>
             </a:extLst>
           </p:cNvPr>
@@ -540,7 +542,7 @@
           <p:cNvPr id="3" name="Untertitel 2">
             <a:extLst>
               <a:ext uri="{FF2B5EF4-FFF2-40B4-BE49-F238E27FC236}">
-                <a16:creationId xmlns:a16="http://schemas.microsoft.com/office/drawing/2014/main" id="{4BE7CFED-2918-4411-876A-1A61023A72BD}"/>
+                <a16:creationId xmlns:a16="http://schemas.microsoft.com/office/drawing/2014/main" xmlns="" id="{4BE7CFED-2918-4411-876A-1A61023A72BD}"/>
               </a:ext>
             </a:extLst>
           </p:cNvPr>
@@ -609,7 +611,7 @@
     </p:spTree>
     <p:extLst>
       <p:ext uri="{BB962C8B-B14F-4D97-AF65-F5344CB8AC3E}">
-        <p14:creationId xmlns:p14="http://schemas.microsoft.com/office/powerpoint/2010/main" val="3627766916"/>
+        <p14:creationId xmlns:p14="http://schemas.microsoft.com/office/powerpoint/2010/main" xmlns="" val="3627766916"/>
       </p:ext>
     </p:extLst>
   </p:cSld>
@@ -649,7 +651,7 @@
           <p:cNvPr id="2" name="Titel 1">
             <a:extLst>
               <a:ext uri="{FF2B5EF4-FFF2-40B4-BE49-F238E27FC236}">
-                <a16:creationId xmlns:a16="http://schemas.microsoft.com/office/drawing/2014/main" id="{310E1DF0-5330-4BFD-88E2-0B38EC1E4E57}"/>
+                <a16:creationId xmlns:a16="http://schemas.microsoft.com/office/drawing/2014/main" xmlns="" id="{310E1DF0-5330-4BFD-88E2-0B38EC1E4E57}"/>
               </a:ext>
             </a:extLst>
           </p:cNvPr>
@@ -678,7 +680,7 @@
           <p:cNvPr id="3" name="Inhaltsplatzhalter 2">
             <a:extLst>
               <a:ext uri="{FF2B5EF4-FFF2-40B4-BE49-F238E27FC236}">
-                <a16:creationId xmlns:a16="http://schemas.microsoft.com/office/drawing/2014/main" id="{8CBBD72A-6111-4CF1-BA2C-E718A94ECCDC}"/>
+                <a16:creationId xmlns:a16="http://schemas.microsoft.com/office/drawing/2014/main" xmlns="" id="{8CBBD72A-6111-4CF1-BA2C-E718A94ECCDC}"/>
               </a:ext>
             </a:extLst>
           </p:cNvPr>
@@ -734,7 +736,7 @@
     </p:spTree>
     <p:extLst>
       <p:ext uri="{BB962C8B-B14F-4D97-AF65-F5344CB8AC3E}">
-        <p14:creationId xmlns:p14="http://schemas.microsoft.com/office/powerpoint/2010/main" val="2109447741"/>
+        <p14:creationId xmlns:p14="http://schemas.microsoft.com/office/powerpoint/2010/main" xmlns="" val="2109447741"/>
       </p:ext>
     </p:extLst>
   </p:cSld>
@@ -774,7 +776,7 @@
           <p:cNvPr id="2" name="Titel 1">
             <a:extLst>
               <a:ext uri="{FF2B5EF4-FFF2-40B4-BE49-F238E27FC236}">
-                <a16:creationId xmlns:a16="http://schemas.microsoft.com/office/drawing/2014/main" id="{63E4985F-13D5-49BC-889F-73761FE13198}"/>
+                <a16:creationId xmlns:a16="http://schemas.microsoft.com/office/drawing/2014/main" xmlns="" id="{63E4985F-13D5-49BC-889F-73761FE13198}"/>
               </a:ext>
             </a:extLst>
           </p:cNvPr>
@@ -812,7 +814,7 @@
           <p:cNvPr id="3" name="Textplatzhalter 2">
             <a:extLst>
               <a:ext uri="{FF2B5EF4-FFF2-40B4-BE49-F238E27FC236}">
-                <a16:creationId xmlns:a16="http://schemas.microsoft.com/office/drawing/2014/main" id="{A0D6C83C-56BF-474C-8657-0BA3611D613C}"/>
+                <a16:creationId xmlns:a16="http://schemas.microsoft.com/office/drawing/2014/main" xmlns="" id="{A0D6C83C-56BF-474C-8657-0BA3611D613C}"/>
               </a:ext>
             </a:extLst>
           </p:cNvPr>
@@ -937,7 +939,7 @@
           <p:cNvPr id="4" name="Datumsplatzhalter 3">
             <a:extLst>
               <a:ext uri="{FF2B5EF4-FFF2-40B4-BE49-F238E27FC236}">
-                <a16:creationId xmlns:a16="http://schemas.microsoft.com/office/drawing/2014/main" id="{F16B5144-C347-497E-A9FE-8BBE7CE87B6A}"/>
+                <a16:creationId xmlns:a16="http://schemas.microsoft.com/office/drawing/2014/main" xmlns="" id="{F16B5144-C347-497E-A9FE-8BBE7CE87B6A}"/>
               </a:ext>
             </a:extLst>
           </p:cNvPr>
@@ -963,7 +965,8 @@
           <a:p>
             <a:fld id="{A5E38E11-CBD4-435C-90F6-BD52B6AE70AE}" type="datetimeFigureOut">
               <a:rPr lang="x-none" smtClean="0"/>
-              <a:t>10/7/2019</a:t>
+              <a:pPr/>
+              <a:t>07/10/2019</a:t>
             </a:fld>
             <a:endParaRPr lang="x-none"/>
           </a:p>
@@ -974,7 +977,7 @@
           <p:cNvPr id="5" name="Fußzeilenplatzhalter 4">
             <a:extLst>
               <a:ext uri="{FF2B5EF4-FFF2-40B4-BE49-F238E27FC236}">
-                <a16:creationId xmlns:a16="http://schemas.microsoft.com/office/drawing/2014/main" id="{0F507366-DE50-49F6-9EBE-7146FEE5D241}"/>
+                <a16:creationId xmlns:a16="http://schemas.microsoft.com/office/drawing/2014/main" xmlns="" id="{0F507366-DE50-49F6-9EBE-7146FEE5D241}"/>
               </a:ext>
             </a:extLst>
           </p:cNvPr>
@@ -1007,7 +1010,7 @@
           <p:cNvPr id="6" name="Foliennummernplatzhalter 5">
             <a:extLst>
               <a:ext uri="{FF2B5EF4-FFF2-40B4-BE49-F238E27FC236}">
-                <a16:creationId xmlns:a16="http://schemas.microsoft.com/office/drawing/2014/main" id="{D36ABCD9-777D-4B92-8F30-3FF548A238FC}"/>
+                <a16:creationId xmlns:a16="http://schemas.microsoft.com/office/drawing/2014/main" xmlns="" id="{D36ABCD9-777D-4B92-8F30-3FF548A238FC}"/>
               </a:ext>
             </a:extLst>
           </p:cNvPr>
@@ -1033,6 +1036,7 @@
           <a:p>
             <a:fld id="{F688C2AE-4FAA-4BB4-A432-5AE7E02740A1}" type="slidenum">
               <a:rPr lang="x-none" smtClean="0"/>
+              <a:pPr/>
               <a:t>‹#›</a:t>
             </a:fld>
             <a:endParaRPr lang="x-none"/>
@@ -1042,7 +1046,7 @@
     </p:spTree>
     <p:extLst>
       <p:ext uri="{BB962C8B-B14F-4D97-AF65-F5344CB8AC3E}">
-        <p14:creationId xmlns:p14="http://schemas.microsoft.com/office/powerpoint/2010/main" val="2038512978"/>
+        <p14:creationId xmlns:p14="http://schemas.microsoft.com/office/powerpoint/2010/main" xmlns="" val="2038512978"/>
       </p:ext>
     </p:extLst>
   </p:cSld>
@@ -1082,7 +1086,7 @@
           <p:cNvPr id="2" name="Titel 1">
             <a:extLst>
               <a:ext uri="{FF2B5EF4-FFF2-40B4-BE49-F238E27FC236}">
-                <a16:creationId xmlns:a16="http://schemas.microsoft.com/office/drawing/2014/main" id="{A30C2CED-11A1-497E-99AB-6D227123B117}"/>
+                <a16:creationId xmlns:a16="http://schemas.microsoft.com/office/drawing/2014/main" xmlns="" id="{A30C2CED-11A1-497E-99AB-6D227123B117}"/>
               </a:ext>
             </a:extLst>
           </p:cNvPr>
@@ -1120,7 +1124,7 @@
           <p:cNvPr id="3" name="Inhaltsplatzhalter 2">
             <a:extLst>
               <a:ext uri="{FF2B5EF4-FFF2-40B4-BE49-F238E27FC236}">
-                <a16:creationId xmlns:a16="http://schemas.microsoft.com/office/drawing/2014/main" id="{986E38F5-F409-48C9-B29B-969FE245AA45}"/>
+                <a16:creationId xmlns:a16="http://schemas.microsoft.com/office/drawing/2014/main" xmlns="" id="{986E38F5-F409-48C9-B29B-969FE245AA45}"/>
               </a:ext>
             </a:extLst>
           </p:cNvPr>
@@ -1211,7 +1215,7 @@
           <p:cNvPr id="4" name="Textplatzhalter 3">
             <a:extLst>
               <a:ext uri="{FF2B5EF4-FFF2-40B4-BE49-F238E27FC236}">
-                <a16:creationId xmlns:a16="http://schemas.microsoft.com/office/drawing/2014/main" id="{56CC2ABE-71CD-49F3-8C4D-E4ED1DA196B4}"/>
+                <a16:creationId xmlns:a16="http://schemas.microsoft.com/office/drawing/2014/main" xmlns="" id="{56CC2ABE-71CD-49F3-8C4D-E4ED1DA196B4}"/>
               </a:ext>
             </a:extLst>
           </p:cNvPr>
@@ -1280,7 +1284,7 @@
     </p:spTree>
     <p:extLst>
       <p:ext uri="{BB962C8B-B14F-4D97-AF65-F5344CB8AC3E}">
-        <p14:creationId xmlns:p14="http://schemas.microsoft.com/office/powerpoint/2010/main" val="277812240"/>
+        <p14:creationId xmlns:p14="http://schemas.microsoft.com/office/powerpoint/2010/main" xmlns="" val="277812240"/>
       </p:ext>
     </p:extLst>
   </p:cSld>
@@ -1320,7 +1324,7 @@
           <p:cNvPr id="2" name="Titelplatzhalter 1">
             <a:extLst>
               <a:ext uri="{FF2B5EF4-FFF2-40B4-BE49-F238E27FC236}">
-                <a16:creationId xmlns:a16="http://schemas.microsoft.com/office/drawing/2014/main" id="{881F9FD2-61D8-497C-B9D7-2514A8F14D65}"/>
+                <a16:creationId xmlns:a16="http://schemas.microsoft.com/office/drawing/2014/main" xmlns="" id="{881F9FD2-61D8-497C-B9D7-2514A8F14D65}"/>
               </a:ext>
             </a:extLst>
           </p:cNvPr>
@@ -1359,7 +1363,7 @@
           <p:cNvPr id="3" name="Textplatzhalter 2">
             <a:extLst>
               <a:ext uri="{FF2B5EF4-FFF2-40B4-BE49-F238E27FC236}">
-                <a16:creationId xmlns:a16="http://schemas.microsoft.com/office/drawing/2014/main" id="{7076A25D-6B07-459F-8705-679FD15E7C73}"/>
+                <a16:creationId xmlns:a16="http://schemas.microsoft.com/office/drawing/2014/main" xmlns="" id="{7076A25D-6B07-459F-8705-679FD15E7C73}"/>
               </a:ext>
             </a:extLst>
           </p:cNvPr>
@@ -1425,7 +1429,7 @@
     </p:spTree>
     <p:extLst>
       <p:ext uri="{BB962C8B-B14F-4D97-AF65-F5344CB8AC3E}">
-        <p14:creationId xmlns:p14="http://schemas.microsoft.com/office/powerpoint/2010/main" val="231580317"/>
+        <p14:creationId xmlns:p14="http://schemas.microsoft.com/office/powerpoint/2010/main" xmlns="" val="231580317"/>
       </p:ext>
     </p:extLst>
   </p:cSld>
@@ -1741,7 +1745,7 @@
           <p:cNvPr id="6" name="Grafik 5">
             <a:extLst>
               <a:ext uri="{FF2B5EF4-FFF2-40B4-BE49-F238E27FC236}">
-                <a16:creationId xmlns:a16="http://schemas.microsoft.com/office/drawing/2014/main" id="{E45AE606-05AD-4310-A9E7-58A3E4831537}"/>
+                <a16:creationId xmlns:a16="http://schemas.microsoft.com/office/drawing/2014/main" xmlns="" id="{E45AE606-05AD-4310-A9E7-58A3E4831537}"/>
               </a:ext>
             </a:extLst>
           </p:cNvPr>
@@ -1751,10 +1755,10 @@
           <p:nvPr/>
         </p:nvPicPr>
         <p:blipFill>
-          <a:blip r:embed="rId2">
+          <a:blip r:embed="rId2" cstate="print">
             <a:extLst>
               <a:ext uri="{28A0092B-C50C-407E-A947-70E740481C1C}">
-                <a14:useLocalDpi xmlns:a14="http://schemas.microsoft.com/office/drawing/2010/main" val="0"/>
+                <a14:useLocalDpi xmlns:a14="http://schemas.microsoft.com/office/drawing/2010/main" xmlns="" val="0"/>
               </a:ext>
             </a:extLst>
           </a:blip>
@@ -1777,7 +1781,7 @@
           <p:cNvPr id="9" name="Grafik 8">
             <a:extLst>
               <a:ext uri="{FF2B5EF4-FFF2-40B4-BE49-F238E27FC236}">
-                <a16:creationId xmlns:a16="http://schemas.microsoft.com/office/drawing/2014/main" id="{BDE6BFD7-C3AF-4092-9CC3-B0309073A821}"/>
+                <a16:creationId xmlns:a16="http://schemas.microsoft.com/office/drawing/2014/main" xmlns="" id="{BDE6BFD7-C3AF-4092-9CC3-B0309073A821}"/>
               </a:ext>
             </a:extLst>
           </p:cNvPr>
@@ -1790,7 +1794,7 @@
           <a:blip r:embed="rId3" cstate="print">
             <a:extLst>
               <a:ext uri="{28A0092B-C50C-407E-A947-70E740481C1C}">
-                <a14:useLocalDpi xmlns:a14="http://schemas.microsoft.com/office/drawing/2010/main" val="0"/>
+                <a14:useLocalDpi xmlns:a14="http://schemas.microsoft.com/office/drawing/2010/main" xmlns="" val="0"/>
               </a:ext>
             </a:extLst>
           </a:blip>
@@ -1810,7 +1814,7 @@
     </p:spTree>
     <p:extLst>
       <p:ext uri="{BB962C8B-B14F-4D97-AF65-F5344CB8AC3E}">
-        <p14:creationId xmlns:p14="http://schemas.microsoft.com/office/powerpoint/2010/main" val="3514297850"/>
+        <p14:creationId xmlns:p14="http://schemas.microsoft.com/office/powerpoint/2010/main" xmlns="" val="3514297850"/>
       </p:ext>
     </p:extLst>
   </p:cSld>
@@ -1842,7 +1846,7 @@
           <p:cNvPr id="5" name="Grafik 4">
             <a:extLst>
               <a:ext uri="{FF2B5EF4-FFF2-40B4-BE49-F238E27FC236}">
-                <a16:creationId xmlns:a16="http://schemas.microsoft.com/office/drawing/2014/main" id="{59FD2549-F0A0-4ABD-9D12-AE6FE6FCB00F}"/>
+                <a16:creationId xmlns:a16="http://schemas.microsoft.com/office/drawing/2014/main" xmlns="" id="{59FD2549-F0A0-4ABD-9D12-AE6FE6FCB00F}"/>
               </a:ext>
             </a:extLst>
           </p:cNvPr>
@@ -1852,10 +1856,10 @@
           <p:nvPr/>
         </p:nvPicPr>
         <p:blipFill rotWithShape="1">
-          <a:blip r:embed="rId2">
+          <a:blip r:embed="rId2" cstate="print">
             <a:extLst>
               <a:ext uri="{28A0092B-C50C-407E-A947-70E740481C1C}">
-                <a14:useLocalDpi xmlns:a14="http://schemas.microsoft.com/office/drawing/2010/main" val="0"/>
+                <a14:useLocalDpi xmlns:a14="http://schemas.microsoft.com/office/drawing/2010/main" xmlns="" val="0"/>
               </a:ext>
             </a:extLst>
           </a:blip>
@@ -1877,7 +1881,7 @@
           <p:cNvPr id="7" name="Grafik 6">
             <a:extLst>
               <a:ext uri="{FF2B5EF4-FFF2-40B4-BE49-F238E27FC236}">
-                <a16:creationId xmlns:a16="http://schemas.microsoft.com/office/drawing/2014/main" id="{44BE2D65-01C5-488E-9B3D-B9F150682BF7}"/>
+                <a16:creationId xmlns:a16="http://schemas.microsoft.com/office/drawing/2014/main" xmlns="" id="{44BE2D65-01C5-488E-9B3D-B9F150682BF7}"/>
               </a:ext>
             </a:extLst>
           </p:cNvPr>
@@ -1890,7 +1894,7 @@
           <a:blip r:embed="rId3" cstate="print">
             <a:extLst>
               <a:ext uri="{28A0092B-C50C-407E-A947-70E740481C1C}">
-                <a14:useLocalDpi xmlns:a14="http://schemas.microsoft.com/office/drawing/2010/main" val="0"/>
+                <a14:useLocalDpi xmlns:a14="http://schemas.microsoft.com/office/drawing/2010/main" xmlns="" val="0"/>
               </a:ext>
             </a:extLst>
           </a:blip>
@@ -1913,7 +1917,7 @@
           <p:cNvPr id="11" name="Titel 10">
             <a:extLst>
               <a:ext uri="{FF2B5EF4-FFF2-40B4-BE49-F238E27FC236}">
-                <a16:creationId xmlns:a16="http://schemas.microsoft.com/office/drawing/2014/main" id="{85220CF1-8FE4-4682-994B-810D27DEEEE1}"/>
+                <a16:creationId xmlns:a16="http://schemas.microsoft.com/office/drawing/2014/main" xmlns="" id="{85220CF1-8FE4-4682-994B-810D27DEEEE1}"/>
               </a:ext>
             </a:extLst>
           </p:cNvPr>
@@ -1955,7 +1959,7 @@
           <p:cNvPr id="12" name="Titel 10">
             <a:extLst>
               <a:ext uri="{FF2B5EF4-FFF2-40B4-BE49-F238E27FC236}">
-                <a16:creationId xmlns:a16="http://schemas.microsoft.com/office/drawing/2014/main" id="{46B7087B-F65C-4B3F-A506-3CE91575FA17}"/>
+                <a16:creationId xmlns:a16="http://schemas.microsoft.com/office/drawing/2014/main" xmlns="" id="{46B7087B-F65C-4B3F-A506-3CE91575FA17}"/>
               </a:ext>
             </a:extLst>
           </p:cNvPr>
@@ -1975,7 +1979,7 @@
         </p:spPr>
         <p:txBody>
           <a:bodyPr vert="horz" lIns="91440" tIns="45720" rIns="91440" bIns="45720" rtlCol="0" anchor="b">
-            <a:normAutofit/>
+            <a:normAutofit fontScale="92500" lnSpcReduction="20000"/>
           </a:bodyPr>
           <a:lstStyle>
             <a:lvl1pPr algn="ctr" defTabSz="914400" rtl="0" eaLnBrk="1" latinLnBrk="0" hangingPunct="1">
@@ -1998,8 +2002,34 @@
           </a:lstStyle>
           <a:p>
             <a:r>
+              <a:rPr lang="en-GB" sz="3200" dirty="0" smtClean="0"/>
+              <a:t>Li Wei</a:t>
+            </a:r>
+          </a:p>
+          <a:p>
+            <a:r>
+              <a:rPr lang="en-GB" sz="3200" dirty="0" smtClean="0"/>
+              <a:t>Michael Golden</a:t>
+            </a:r>
+          </a:p>
+          <a:p>
+            <a:r>
+              <a:rPr lang="en-GB" sz="3200" dirty="0" smtClean="0"/>
+              <a:t>Moritz Moeller</a:t>
+            </a:r>
+          </a:p>
+          <a:p>
+            <a:r>
+              <a:rPr lang="en-GB" sz="3200" dirty="0" smtClean="0"/>
+              <a:t>James </a:t>
+            </a:r>
+            <a:r>
+              <a:rPr lang="en-GB" sz="3200" dirty="0" err="1" smtClean="0"/>
+              <a:t>Wilsenach</a:t>
+            </a:r>
+            <a:r>
               <a:rPr lang="en-GB" sz="3200" dirty="0"/>
-              <a:t>NAMES OF GROUP MEMBERS</a:t>
+              <a:t/>
             </a:r>
             <a:br>
               <a:rPr lang="en-GB" sz="3200" dirty="0"/>
@@ -2011,7 +2041,7 @@
     </p:spTree>
     <p:extLst>
       <p:ext uri="{BB962C8B-B14F-4D97-AF65-F5344CB8AC3E}">
-        <p14:creationId xmlns:p14="http://schemas.microsoft.com/office/powerpoint/2010/main" val="3751392105"/>
+        <p14:creationId xmlns:p14="http://schemas.microsoft.com/office/powerpoint/2010/main" xmlns="" val="3751392105"/>
       </p:ext>
     </p:extLst>
   </p:cSld>
@@ -2043,7 +2073,7 @@
           <p:cNvPr id="2" name="Titel 1">
             <a:extLst>
               <a:ext uri="{FF2B5EF4-FFF2-40B4-BE49-F238E27FC236}">
-                <a16:creationId xmlns:a16="http://schemas.microsoft.com/office/drawing/2014/main" id="{B95BCD18-302D-4FB0-B92D-F59B773B6833}"/>
+                <a16:creationId xmlns:a16="http://schemas.microsoft.com/office/drawing/2014/main" xmlns="" id="{B95BCD18-302D-4FB0-B92D-F59B773B6833}"/>
               </a:ext>
             </a:extLst>
           </p:cNvPr>
@@ -2072,7 +2102,7 @@
           <p:cNvPr id="3" name="Inhaltsplatzhalter 2">
             <a:extLst>
               <a:ext uri="{FF2B5EF4-FFF2-40B4-BE49-F238E27FC236}">
-                <a16:creationId xmlns:a16="http://schemas.microsoft.com/office/drawing/2014/main" id="{E59E5E55-ADA9-4327-85CF-331D2393859F}"/>
+                <a16:creationId xmlns:a16="http://schemas.microsoft.com/office/drawing/2014/main" xmlns="" id="{E59E5E55-ADA9-4327-85CF-331D2393859F}"/>
               </a:ext>
             </a:extLst>
           </p:cNvPr>
@@ -2163,7 +2193,7 @@
           <p:cNvPr id="4" name="Grafik 3">
             <a:extLst>
               <a:ext uri="{FF2B5EF4-FFF2-40B4-BE49-F238E27FC236}">
-                <a16:creationId xmlns:a16="http://schemas.microsoft.com/office/drawing/2014/main" id="{300411DF-B2A6-4A2A-8E76-2F8AA3F86A8B}"/>
+                <a16:creationId xmlns:a16="http://schemas.microsoft.com/office/drawing/2014/main" xmlns="" id="{300411DF-B2A6-4A2A-8E76-2F8AA3F86A8B}"/>
               </a:ext>
             </a:extLst>
           </p:cNvPr>
@@ -2176,7 +2206,7 @@
           <a:blip r:embed="rId2" cstate="print">
             <a:extLst>
               <a:ext uri="{28A0092B-C50C-407E-A947-70E740481C1C}">
-                <a14:useLocalDpi xmlns:a14="http://schemas.microsoft.com/office/drawing/2010/main" val="0"/>
+                <a14:useLocalDpi xmlns:a14="http://schemas.microsoft.com/office/drawing/2010/main" xmlns="" val="0"/>
               </a:ext>
             </a:extLst>
           </a:blip>
@@ -2197,7 +2227,7 @@
     </p:spTree>
     <p:extLst>
       <p:ext uri="{BB962C8B-B14F-4D97-AF65-F5344CB8AC3E}">
-        <p14:creationId xmlns:p14="http://schemas.microsoft.com/office/powerpoint/2010/main" val="2789252034"/>
+        <p14:creationId xmlns:p14="http://schemas.microsoft.com/office/powerpoint/2010/main" xmlns="" val="2789252034"/>
       </p:ext>
     </p:extLst>
   </p:cSld>
@@ -2229,7 +2259,7 @@
           <p:cNvPr id="2" name="Titel 1">
             <a:extLst>
               <a:ext uri="{FF2B5EF4-FFF2-40B4-BE49-F238E27FC236}">
-                <a16:creationId xmlns:a16="http://schemas.microsoft.com/office/drawing/2014/main" id="{B95BCD18-302D-4FB0-B92D-F59B773B6833}"/>
+                <a16:creationId xmlns:a16="http://schemas.microsoft.com/office/drawing/2014/main" xmlns="" id="{B95BCD18-302D-4FB0-B92D-F59B773B6833}"/>
               </a:ext>
             </a:extLst>
           </p:cNvPr>
@@ -2258,7 +2288,7 @@
           <p:cNvPr id="3" name="Inhaltsplatzhalter 2">
             <a:extLst>
               <a:ext uri="{FF2B5EF4-FFF2-40B4-BE49-F238E27FC236}">
-                <a16:creationId xmlns:a16="http://schemas.microsoft.com/office/drawing/2014/main" id="{E59E5E55-ADA9-4327-85CF-331D2393859F}"/>
+                <a16:creationId xmlns:a16="http://schemas.microsoft.com/office/drawing/2014/main" xmlns="" id="{E59E5E55-ADA9-4327-85CF-331D2393859F}"/>
               </a:ext>
             </a:extLst>
           </p:cNvPr>
@@ -2380,7 +2410,7 @@
           <p:cNvPr id="4" name="Grafik 3">
             <a:extLst>
               <a:ext uri="{FF2B5EF4-FFF2-40B4-BE49-F238E27FC236}">
-                <a16:creationId xmlns:a16="http://schemas.microsoft.com/office/drawing/2014/main" id="{300411DF-B2A6-4A2A-8E76-2F8AA3F86A8B}"/>
+                <a16:creationId xmlns:a16="http://schemas.microsoft.com/office/drawing/2014/main" xmlns="" id="{300411DF-B2A6-4A2A-8E76-2F8AA3F86A8B}"/>
               </a:ext>
             </a:extLst>
           </p:cNvPr>
@@ -2393,7 +2423,7 @@
           <a:blip r:embed="rId2" cstate="print">
             <a:extLst>
               <a:ext uri="{28A0092B-C50C-407E-A947-70E740481C1C}">
-                <a14:useLocalDpi xmlns:a14="http://schemas.microsoft.com/office/drawing/2010/main" val="0"/>
+                <a14:useLocalDpi xmlns:a14="http://schemas.microsoft.com/office/drawing/2010/main" xmlns="" val="0"/>
               </a:ext>
             </a:extLst>
           </a:blip>
@@ -2414,7 +2444,7 @@
     </p:spTree>
     <p:extLst>
       <p:ext uri="{BB962C8B-B14F-4D97-AF65-F5344CB8AC3E}">
-        <p14:creationId xmlns:p14="http://schemas.microsoft.com/office/powerpoint/2010/main" val="2600432059"/>
+        <p14:creationId xmlns:p14="http://schemas.microsoft.com/office/powerpoint/2010/main" xmlns="" val="2600432059"/>
       </p:ext>
     </p:extLst>
   </p:cSld>
@@ -2446,7 +2476,7 @@
           <p:cNvPr id="2" name="Titel 1">
             <a:extLst>
               <a:ext uri="{FF2B5EF4-FFF2-40B4-BE49-F238E27FC236}">
-                <a16:creationId xmlns:a16="http://schemas.microsoft.com/office/drawing/2014/main" id="{B95BCD18-302D-4FB0-B92D-F59B773B6833}"/>
+                <a16:creationId xmlns:a16="http://schemas.microsoft.com/office/drawing/2014/main" xmlns="" id="{B95BCD18-302D-4FB0-B92D-F59B773B6833}"/>
               </a:ext>
             </a:extLst>
           </p:cNvPr>
@@ -2482,7 +2512,7 @@
           <p:cNvPr id="3" name="Inhaltsplatzhalter 2">
             <a:extLst>
               <a:ext uri="{FF2B5EF4-FFF2-40B4-BE49-F238E27FC236}">
-                <a16:creationId xmlns:a16="http://schemas.microsoft.com/office/drawing/2014/main" id="{E59E5E55-ADA9-4327-85CF-331D2393859F}"/>
+                <a16:creationId xmlns:a16="http://schemas.microsoft.com/office/drawing/2014/main" xmlns="" id="{E59E5E55-ADA9-4327-85CF-331D2393859F}"/>
               </a:ext>
             </a:extLst>
           </p:cNvPr>
@@ -2522,8 +2552,47 @@
                   <a:srgbClr val="FFFFFF"/>
                 </a:solidFill>
               </a:rPr>
-              <a:t>Show picture of leeway </a:t>
-            </a:r>
+              <a:t>Show picture of </a:t>
+            </a:r>
+            <a:r>
+              <a:rPr lang="de-DE" b="1" dirty="0" smtClean="0">
+                <a:solidFill>
+                  <a:srgbClr val="FFFFFF"/>
+                </a:solidFill>
+              </a:rPr>
+              <a:t>leeway</a:t>
+            </a:r>
+          </a:p>
+          <a:p>
+            <a:pPr marL="0" indent="0">
+              <a:buNone/>
+            </a:pPr>
+            <a:r>
+              <a:rPr lang="de-DE" b="1" dirty="0" smtClean="0">
+                <a:solidFill>
+                  <a:srgbClr val="FFFFFF"/>
+                </a:solidFill>
+              </a:rPr>
+              <a:t>Method works for web data</a:t>
+            </a:r>
+          </a:p>
+          <a:p>
+            <a:pPr marL="0" indent="0">
+              <a:buNone/>
+            </a:pPr>
+            <a:r>
+              <a:rPr lang="de-DE" b="1" dirty="0" smtClean="0">
+                <a:solidFill>
+                  <a:srgbClr val="FFFFFF"/>
+                </a:solidFill>
+              </a:rPr>
+              <a:t> </a:t>
+            </a:r>
+            <a:endParaRPr lang="de-DE" b="1" dirty="0">
+              <a:solidFill>
+                <a:srgbClr val="FFFFFF"/>
+              </a:solidFill>
+            </a:endParaRPr>
           </a:p>
           <a:p>
             <a:pPr marL="0" indent="0">
@@ -2542,7 +2611,7 @@
           <p:cNvPr id="4" name="Grafik 3">
             <a:extLst>
               <a:ext uri="{FF2B5EF4-FFF2-40B4-BE49-F238E27FC236}">
-                <a16:creationId xmlns:a16="http://schemas.microsoft.com/office/drawing/2014/main" id="{300411DF-B2A6-4A2A-8E76-2F8AA3F86A8B}"/>
+                <a16:creationId xmlns:a16="http://schemas.microsoft.com/office/drawing/2014/main" xmlns="" id="{300411DF-B2A6-4A2A-8E76-2F8AA3F86A8B}"/>
               </a:ext>
             </a:extLst>
           </p:cNvPr>
@@ -2555,7 +2624,7 @@
           <a:blip r:embed="rId2" cstate="print">
             <a:extLst>
               <a:ext uri="{28A0092B-C50C-407E-A947-70E740481C1C}">
-                <a14:useLocalDpi xmlns:a14="http://schemas.microsoft.com/office/drawing/2010/main" val="0"/>
+                <a14:useLocalDpi xmlns:a14="http://schemas.microsoft.com/office/drawing/2010/main" xmlns="" val="0"/>
               </a:ext>
             </a:extLst>
           </a:blip>
@@ -2573,10 +2642,42 @@
           </a:prstGeom>
         </p:spPr>
       </p:pic>
+      <p:pic>
+        <p:nvPicPr>
+          <p:cNvPr id="1026" name="Picture 2"/>
+          <p:cNvPicPr>
+            <a:picLocks noChangeAspect="1" noChangeArrowheads="1"/>
+          </p:cNvPicPr>
+          <p:nvPr/>
+        </p:nvPicPr>
+        <p:blipFill>
+          <a:blip r:embed="rId3" cstate="print"/>
+          <a:srcRect/>
+          <a:stretch>
+            <a:fillRect/>
+          </a:stretch>
+        </p:blipFill>
+        <p:spPr bwMode="auto">
+          <a:xfrm>
+            <a:off x="5909094" y="1959904"/>
+            <a:ext cx="6066527" cy="3422979"/>
+          </a:xfrm>
+          <a:prstGeom prst="rect">
+            <a:avLst/>
+          </a:prstGeom>
+          <a:noFill/>
+          <a:ln w="9525">
+            <a:noFill/>
+            <a:miter lim="800000"/>
+            <a:headEnd/>
+            <a:tailEnd/>
+          </a:ln>
+        </p:spPr>
+      </p:pic>
     </p:spTree>
     <p:extLst>
       <p:ext uri="{BB962C8B-B14F-4D97-AF65-F5344CB8AC3E}">
-        <p14:creationId xmlns:p14="http://schemas.microsoft.com/office/powerpoint/2010/main" val="2798779998"/>
+        <p14:creationId xmlns:p14="http://schemas.microsoft.com/office/powerpoint/2010/main" xmlns="" val="2798779998"/>
       </p:ext>
     </p:extLst>
   </p:cSld>
@@ -2608,7 +2709,7 @@
           <p:cNvPr id="2" name="Titel 1">
             <a:extLst>
               <a:ext uri="{FF2B5EF4-FFF2-40B4-BE49-F238E27FC236}">
-                <a16:creationId xmlns:a16="http://schemas.microsoft.com/office/drawing/2014/main" id="{B95BCD18-302D-4FB0-B92D-F59B773B6833}"/>
+                <a16:creationId xmlns:a16="http://schemas.microsoft.com/office/drawing/2014/main" xmlns="" id="{B95BCD18-302D-4FB0-B92D-F59B773B6833}"/>
               </a:ext>
             </a:extLst>
           </p:cNvPr>
@@ -2644,7 +2745,7 @@
           <p:cNvPr id="3" name="Inhaltsplatzhalter 2">
             <a:extLst>
               <a:ext uri="{FF2B5EF4-FFF2-40B4-BE49-F238E27FC236}">
-                <a16:creationId xmlns:a16="http://schemas.microsoft.com/office/drawing/2014/main" id="{E59E5E55-ADA9-4327-85CF-331D2393859F}"/>
+                <a16:creationId xmlns:a16="http://schemas.microsoft.com/office/drawing/2014/main" xmlns="" id="{E59E5E55-ADA9-4327-85CF-331D2393859F}"/>
               </a:ext>
             </a:extLst>
           </p:cNvPr>
@@ -2755,7 +2856,7 @@
           <p:cNvPr id="4" name="Grafik 3">
             <a:extLst>
               <a:ext uri="{FF2B5EF4-FFF2-40B4-BE49-F238E27FC236}">
-                <a16:creationId xmlns:a16="http://schemas.microsoft.com/office/drawing/2014/main" id="{300411DF-B2A6-4A2A-8E76-2F8AA3F86A8B}"/>
+                <a16:creationId xmlns:a16="http://schemas.microsoft.com/office/drawing/2014/main" xmlns="" id="{300411DF-B2A6-4A2A-8E76-2F8AA3F86A8B}"/>
               </a:ext>
             </a:extLst>
           </p:cNvPr>
@@ -2768,7 +2869,7 @@
           <a:blip r:embed="rId2" cstate="print">
             <a:extLst>
               <a:ext uri="{28A0092B-C50C-407E-A947-70E740481C1C}">
-                <a14:useLocalDpi xmlns:a14="http://schemas.microsoft.com/office/drawing/2010/main" val="0"/>
+                <a14:useLocalDpi xmlns:a14="http://schemas.microsoft.com/office/drawing/2010/main" xmlns="" val="0"/>
               </a:ext>
             </a:extLst>
           </a:blip>
@@ -2786,10 +2887,102 @@
           </a:prstGeom>
         </p:spPr>
       </p:pic>
+      <p:sp>
+        <p:nvSpPr>
+          <p:cNvPr id="5122" name="AutoShape 2" descr="https://mail.google.com/mail/u/0?ui=2&amp;ik=ecd4b1839f&amp;attid=0.1&amp;permmsgid=msg-a:r6466515364856659731&amp;th=16da5736c29dae07&amp;view=fimg&amp;sz=s0-l75-ft&amp;attbid=ANGjdJ8hMKbv2aLR9UpA03j1XnXLtOBC76QskiYaNYnBA8P3g2urWT119LdXiVRA-DKa5gNB9Kb9Euh7vaa3oQM608r2Inr9GsR8O3Xzrhn5hArxk5-DMiTSI1NXyJg&amp;disp=emb&amp;realattid=16da5732ebb8b09ad291"/>
+          <p:cNvSpPr>
+            <a:spLocks noChangeAspect="1" noChangeArrowheads="1"/>
+          </p:cNvSpPr>
+          <p:nvPr/>
+        </p:nvSpPr>
+        <p:spPr bwMode="auto">
+          <a:xfrm>
+            <a:off x="155575" y="-144463"/>
+            <a:ext cx="304800" cy="304801"/>
+          </a:xfrm>
+          <a:prstGeom prst="rect">
+            <a:avLst/>
+          </a:prstGeom>
+          <a:noFill/>
+        </p:spPr>
+        <p:txBody>
+          <a:bodyPr vert="horz" wrap="square" lIns="91440" tIns="45720" rIns="91440" bIns="45720" numCol="1" anchor="t" anchorCtr="0" compatLnSpc="1">
+            <a:prstTxWarp prst="textNoShape">
+              <a:avLst/>
+            </a:prstTxWarp>
+          </a:bodyPr>
+          <a:lstStyle/>
+          <a:p>
+            <a:endParaRPr lang="en-GB"/>
+          </a:p>
+        </p:txBody>
+      </p:sp>
+      <p:sp>
+        <p:nvSpPr>
+          <p:cNvPr id="5124" name="AutoShape 4" descr="https://mail.google.com/mail/u/0?ui=2&amp;ik=ecd4b1839f&amp;attid=0.1&amp;permmsgid=msg-a:r6466515364856659731&amp;th=16da5736c29dae07&amp;view=fimg&amp;sz=s0-l75-ft&amp;attbid=ANGjdJ8hMKbv2aLR9UpA03j1XnXLtOBC76QskiYaNYnBA8P3g2urWT119LdXiVRA-DKa5gNB9Kb9Euh7vaa3oQM608r2Inr9GsR8O3Xzrhn5hArxk5-DMiTSI1NXyJg&amp;disp=emb&amp;realattid=16da5732ebb8b09ad291"/>
+          <p:cNvSpPr>
+            <a:spLocks noChangeAspect="1" noChangeArrowheads="1"/>
+          </p:cNvSpPr>
+          <p:nvPr/>
+        </p:nvSpPr>
+        <p:spPr bwMode="auto">
+          <a:xfrm>
+            <a:off x="155575" y="-144463"/>
+            <a:ext cx="304800" cy="304801"/>
+          </a:xfrm>
+          <a:prstGeom prst="rect">
+            <a:avLst/>
+          </a:prstGeom>
+          <a:noFill/>
+        </p:spPr>
+        <p:txBody>
+          <a:bodyPr vert="horz" wrap="square" lIns="91440" tIns="45720" rIns="91440" bIns="45720" numCol="1" anchor="t" anchorCtr="0" compatLnSpc="1">
+            <a:prstTxWarp prst="textNoShape">
+              <a:avLst/>
+            </a:prstTxWarp>
+          </a:bodyPr>
+          <a:lstStyle/>
+          <a:p>
+            <a:endParaRPr lang="en-GB"/>
+          </a:p>
+        </p:txBody>
+      </p:sp>
+      <p:pic>
+        <p:nvPicPr>
+          <p:cNvPr id="5126" name="Picture 6"/>
+          <p:cNvPicPr>
+            <a:picLocks noChangeAspect="1" noChangeArrowheads="1"/>
+          </p:cNvPicPr>
+          <p:nvPr/>
+        </p:nvPicPr>
+        <p:blipFill>
+          <a:blip r:embed="rId3" cstate="print"/>
+          <a:srcRect/>
+          <a:stretch>
+            <a:fillRect/>
+          </a:stretch>
+        </p:blipFill>
+        <p:spPr bwMode="auto">
+          <a:xfrm>
+            <a:off x="8050601" y="1604513"/>
+            <a:ext cx="3509872" cy="4813539"/>
+          </a:xfrm>
+          <a:prstGeom prst="rect">
+            <a:avLst/>
+          </a:prstGeom>
+          <a:noFill/>
+          <a:ln w="9525">
+            <a:noFill/>
+            <a:miter lim="800000"/>
+            <a:headEnd/>
+            <a:tailEnd/>
+          </a:ln>
+        </p:spPr>
+      </p:pic>
     </p:spTree>
     <p:extLst>
       <p:ext uri="{BB962C8B-B14F-4D97-AF65-F5344CB8AC3E}">
-        <p14:creationId xmlns:p14="http://schemas.microsoft.com/office/powerpoint/2010/main" val="3829638140"/>
+        <p14:creationId xmlns:p14="http://schemas.microsoft.com/office/powerpoint/2010/main" xmlns="" val="3829638140"/>
       </p:ext>
     </p:extLst>
   </p:cSld>
@@ -2821,7 +3014,7 @@
           <p:cNvPr id="2" name="Titel 1">
             <a:extLst>
               <a:ext uri="{FF2B5EF4-FFF2-40B4-BE49-F238E27FC236}">
-                <a16:creationId xmlns:a16="http://schemas.microsoft.com/office/drawing/2014/main" id="{B95BCD18-302D-4FB0-B92D-F59B773B6833}"/>
+                <a16:creationId xmlns:a16="http://schemas.microsoft.com/office/drawing/2014/main" xmlns="" id="{B95BCD18-302D-4FB0-B92D-F59B773B6833}"/>
               </a:ext>
             </a:extLst>
           </p:cNvPr>
@@ -2850,7 +3043,7 @@
           <p:cNvPr id="3" name="Inhaltsplatzhalter 2">
             <a:extLst>
               <a:ext uri="{FF2B5EF4-FFF2-40B4-BE49-F238E27FC236}">
-                <a16:creationId xmlns:a16="http://schemas.microsoft.com/office/drawing/2014/main" id="{E59E5E55-ADA9-4327-85CF-331D2393859F}"/>
+                <a16:creationId xmlns:a16="http://schemas.microsoft.com/office/drawing/2014/main" xmlns="" id="{E59E5E55-ADA9-4327-85CF-331D2393859F}"/>
               </a:ext>
             </a:extLst>
           </p:cNvPr>
@@ -2961,7 +3154,7 @@
           <p:cNvPr id="4" name="Grafik 3">
             <a:extLst>
               <a:ext uri="{FF2B5EF4-FFF2-40B4-BE49-F238E27FC236}">
-                <a16:creationId xmlns:a16="http://schemas.microsoft.com/office/drawing/2014/main" id="{300411DF-B2A6-4A2A-8E76-2F8AA3F86A8B}"/>
+                <a16:creationId xmlns:a16="http://schemas.microsoft.com/office/drawing/2014/main" xmlns="" id="{300411DF-B2A6-4A2A-8E76-2F8AA3F86A8B}"/>
               </a:ext>
             </a:extLst>
           </p:cNvPr>
@@ -2974,7 +3167,7 @@
           <a:blip r:embed="rId2" cstate="print">
             <a:extLst>
               <a:ext uri="{28A0092B-C50C-407E-A947-70E740481C1C}">
-                <a14:useLocalDpi xmlns:a14="http://schemas.microsoft.com/office/drawing/2010/main" val="0"/>
+                <a14:useLocalDpi xmlns:a14="http://schemas.microsoft.com/office/drawing/2010/main" xmlns="" val="0"/>
               </a:ext>
             </a:extLst>
           </a:blip>
@@ -2995,7 +3188,7 @@
     </p:spTree>
     <p:extLst>
       <p:ext uri="{BB962C8B-B14F-4D97-AF65-F5344CB8AC3E}">
-        <p14:creationId xmlns:p14="http://schemas.microsoft.com/office/powerpoint/2010/main" val="640049257"/>
+        <p14:creationId xmlns:p14="http://schemas.microsoft.com/office/powerpoint/2010/main" xmlns="" val="640049257"/>
       </p:ext>
     </p:extLst>
   </p:cSld>
@@ -3027,7 +3220,7 @@
           <p:cNvPr id="2" name="Titel 1">
             <a:extLst>
               <a:ext uri="{FF2B5EF4-FFF2-40B4-BE49-F238E27FC236}">
-                <a16:creationId xmlns:a16="http://schemas.microsoft.com/office/drawing/2014/main" id="{B95BCD18-302D-4FB0-B92D-F59B773B6833}"/>
+                <a16:creationId xmlns:a16="http://schemas.microsoft.com/office/drawing/2014/main" xmlns="" id="{B95BCD18-302D-4FB0-B92D-F59B773B6833}"/>
               </a:ext>
             </a:extLst>
           </p:cNvPr>
@@ -3063,7 +3256,7 @@
           <p:cNvPr id="3" name="Inhaltsplatzhalter 2">
             <a:extLst>
               <a:ext uri="{FF2B5EF4-FFF2-40B4-BE49-F238E27FC236}">
-                <a16:creationId xmlns:a16="http://schemas.microsoft.com/office/drawing/2014/main" id="{E59E5E55-ADA9-4327-85CF-331D2393859F}"/>
+                <a16:creationId xmlns:a16="http://schemas.microsoft.com/office/drawing/2014/main" xmlns="" id="{E59E5E55-ADA9-4327-85CF-331D2393859F}"/>
               </a:ext>
             </a:extLst>
           </p:cNvPr>
@@ -3097,7 +3290,7 @@
           <p:cNvPr id="4" name="Grafik 3">
             <a:extLst>
               <a:ext uri="{FF2B5EF4-FFF2-40B4-BE49-F238E27FC236}">
-                <a16:creationId xmlns:a16="http://schemas.microsoft.com/office/drawing/2014/main" id="{300411DF-B2A6-4A2A-8E76-2F8AA3F86A8B}"/>
+                <a16:creationId xmlns:a16="http://schemas.microsoft.com/office/drawing/2014/main" xmlns="" id="{300411DF-B2A6-4A2A-8E76-2F8AA3F86A8B}"/>
               </a:ext>
             </a:extLst>
           </p:cNvPr>
@@ -3110,7 +3303,7 @@
           <a:blip r:embed="rId2" cstate="print">
             <a:extLst>
               <a:ext uri="{28A0092B-C50C-407E-A947-70E740481C1C}">
-                <a14:useLocalDpi xmlns:a14="http://schemas.microsoft.com/office/drawing/2010/main" val="0"/>
+                <a14:useLocalDpi xmlns:a14="http://schemas.microsoft.com/office/drawing/2010/main" xmlns="" val="0"/>
               </a:ext>
             </a:extLst>
           </a:blip>
@@ -3131,7 +3324,7 @@
     </p:spTree>
     <p:extLst>
       <p:ext uri="{BB962C8B-B14F-4D97-AF65-F5344CB8AC3E}">
-        <p14:creationId xmlns:p14="http://schemas.microsoft.com/office/powerpoint/2010/main" val="606855018"/>
+        <p14:creationId xmlns:p14="http://schemas.microsoft.com/office/powerpoint/2010/main" xmlns="" val="606855018"/>
       </p:ext>
     </p:extLst>
   </p:cSld>
@@ -3163,7 +3356,7 @@
           <p:cNvPr id="5" name="Grafik 4">
             <a:extLst>
               <a:ext uri="{FF2B5EF4-FFF2-40B4-BE49-F238E27FC236}">
-                <a16:creationId xmlns:a16="http://schemas.microsoft.com/office/drawing/2014/main" id="{59FD2549-F0A0-4ABD-9D12-AE6FE6FCB00F}"/>
+                <a16:creationId xmlns:a16="http://schemas.microsoft.com/office/drawing/2014/main" xmlns="" id="{59FD2549-F0A0-4ABD-9D12-AE6FE6FCB00F}"/>
               </a:ext>
             </a:extLst>
           </p:cNvPr>
@@ -3173,10 +3366,10 @@
           <p:nvPr/>
         </p:nvPicPr>
         <p:blipFill rotWithShape="1">
-          <a:blip r:embed="rId2">
+          <a:blip r:embed="rId2" cstate="print">
             <a:extLst>
               <a:ext uri="{28A0092B-C50C-407E-A947-70E740481C1C}">
-                <a14:useLocalDpi xmlns:a14="http://schemas.microsoft.com/office/drawing/2010/main" val="0"/>
+                <a14:useLocalDpi xmlns:a14="http://schemas.microsoft.com/office/drawing/2010/main" xmlns="" val="0"/>
               </a:ext>
             </a:extLst>
           </a:blip>
@@ -3198,7 +3391,7 @@
           <p:cNvPr id="7" name="Grafik 6">
             <a:extLst>
               <a:ext uri="{FF2B5EF4-FFF2-40B4-BE49-F238E27FC236}">
-                <a16:creationId xmlns:a16="http://schemas.microsoft.com/office/drawing/2014/main" id="{44BE2D65-01C5-488E-9B3D-B9F150682BF7}"/>
+                <a16:creationId xmlns:a16="http://schemas.microsoft.com/office/drawing/2014/main" xmlns="" id="{44BE2D65-01C5-488E-9B3D-B9F150682BF7}"/>
               </a:ext>
             </a:extLst>
           </p:cNvPr>
@@ -3211,7 +3404,7 @@
           <a:blip r:embed="rId3" cstate="print">
             <a:extLst>
               <a:ext uri="{28A0092B-C50C-407E-A947-70E740481C1C}">
-                <a14:useLocalDpi xmlns:a14="http://schemas.microsoft.com/office/drawing/2010/main" val="0"/>
+                <a14:useLocalDpi xmlns:a14="http://schemas.microsoft.com/office/drawing/2010/main" xmlns="" val="0"/>
               </a:ext>
             </a:extLst>
           </a:blip>
@@ -3234,7 +3427,7 @@
           <p:cNvPr id="11" name="Titel 10">
             <a:extLst>
               <a:ext uri="{FF2B5EF4-FFF2-40B4-BE49-F238E27FC236}">
-                <a16:creationId xmlns:a16="http://schemas.microsoft.com/office/drawing/2014/main" id="{85220CF1-8FE4-4682-994B-810D27DEEEE1}"/>
+                <a16:creationId xmlns:a16="http://schemas.microsoft.com/office/drawing/2014/main" xmlns="" id="{85220CF1-8FE4-4682-994B-810D27DEEEE1}"/>
               </a:ext>
             </a:extLst>
           </p:cNvPr>
@@ -3276,7 +3469,7 @@
           <p:cNvPr id="12" name="Titel 10">
             <a:extLst>
               <a:ext uri="{FF2B5EF4-FFF2-40B4-BE49-F238E27FC236}">
-                <a16:creationId xmlns:a16="http://schemas.microsoft.com/office/drawing/2014/main" id="{46B7087B-F65C-4B3F-A506-3CE91575FA17}"/>
+                <a16:creationId xmlns:a16="http://schemas.microsoft.com/office/drawing/2014/main" xmlns="" id="{46B7087B-F65C-4B3F-A506-3CE91575FA17}"/>
               </a:ext>
             </a:extLst>
           </p:cNvPr>
@@ -3332,7 +3525,7 @@
     </p:spTree>
     <p:extLst>
       <p:ext uri="{BB962C8B-B14F-4D97-AF65-F5344CB8AC3E}">
-        <p14:creationId xmlns:p14="http://schemas.microsoft.com/office/powerpoint/2010/main" val="3489794051"/>
+        <p14:creationId xmlns:p14="http://schemas.microsoft.com/office/powerpoint/2010/main" xmlns="" val="3489794051"/>
       </p:ext>
     </p:extLst>
   </p:cSld>
@@ -3385,7 +3578,7 @@
     </a:clrScheme>
     <a:fontScheme name="Office">
       <a:majorFont>
-        <a:latin typeface="Calibri Light" panose="020F0302020204030204"/>
+        <a:latin typeface="Calibri Light"/>
         <a:ea typeface=""/>
         <a:cs typeface=""/>
         <a:font script="Jpan" typeface="游ゴシック Light"/>
@@ -3437,7 +3630,7 @@
         <a:font script="Tfng" typeface="Ebrima"/>
       </a:majorFont>
       <a:minorFont>
-        <a:latin typeface="Calibri" panose="020F0502020204030204"/>
+        <a:latin typeface="Calibri"/>
         <a:ea typeface=""/>
         <a:cs typeface=""/>
         <a:font script="Jpan" typeface="游ゴシック"/>
@@ -3631,7 +3824,7 @@
   <a:extraClrSchemeLst/>
   <a:extLst>
     <a:ext uri="{05A4C25C-085E-4340-85A3-A5531E510DB2}">
-      <thm15:themeFamily xmlns:thm15="http://schemas.microsoft.com/office/thememl/2012/main" name="Office Theme" id="{62F939B6-93AF-4DB8-9C6B-D6C7DFDC589F}" vid="{4A3C46E8-61CC-4603-A589-7422A47A8E4A}"/>
+      <thm15:themeFamily xmlns:thm15="http://schemas.microsoft.com/office/thememl/2012/main" xmlns="" name="Office Theme" id="{62F939B6-93AF-4DB8-9C6B-D6C7DFDC589F}" vid="{4A3C46E8-61CC-4603-A589-7422A47A8E4A}"/>
     </a:ext>
   </a:extLst>
 </a:theme>
@@ -3680,7 +3873,7 @@
     </a:clrScheme>
     <a:fontScheme name="Office">
       <a:majorFont>
-        <a:latin typeface="Calibri Light" panose="020F0302020204030204"/>
+        <a:latin typeface="Calibri Light"/>
         <a:ea typeface=""/>
         <a:cs typeface=""/>
         <a:font script="Jpan" typeface="ＭＳ Ｐゴシック"/>
@@ -3715,7 +3908,7 @@
         <a:font script="Geor" typeface="Sylfaen"/>
       </a:majorFont>
       <a:minorFont>
-        <a:latin typeface="Calibri" panose="020F0502020204030204"/>
+        <a:latin typeface="Calibri"/>
         <a:ea typeface=""/>
         <a:cs typeface=""/>
         <a:font script="Jpan" typeface="ＭＳ Ｐゴシック"/>
@@ -3892,7 +4085,7 @@
   <a:extraClrSchemeLst/>
   <a:extLst>
     <a:ext uri="{05A4C25C-085E-4340-85A3-A5531E510DB2}">
-      <thm15:themeFamily xmlns:thm15="http://schemas.microsoft.com/office/thememl/2012/main" name="Office Theme" id="{62F939B6-93AF-4DB8-9C6B-D6C7DFDC589F}" vid="{4A3C46E8-61CC-4603-A589-7422A47A8E4A}"/>
+      <thm15:themeFamily xmlns:thm15="http://schemas.microsoft.com/office/thememl/2012/main" xmlns="" name="Office Theme" id="{62F939B6-93AF-4DB8-9C6B-D6C7DFDC589F}" vid="{4A3C46E8-61CC-4603-A589-7422A47A8E4A}"/>
     </a:ext>
   </a:extLst>
 </a:theme>

</xml_diff>